<commit_message>
ModelClassBetterOopDiagram: simplify to its bare essentials
ModelClassBetterOopDiagram is used in the Developer Guide to show how
the storage of tags in the model can be tweaked to be made "more OOP".

As such, ModelClassBetterOopDiagram is mostly similar to
ModelClassDiagram with relatively few differences. This means that
whenever ModelClassDiagram changes, the changes must be replicated in
ModelClassBetterOopDiagram as well. This unnecessarily increases the
maintenance effort.

Fix this by stripping down ModelClassBetterOopDiagram to its bare
essentials -- the places where it differs from ModelClassDiagram. This
way, ModelClassBetterOopDiagram won't need to be updated as often.
</commit_message>
<xml_diff>
--- a/docs/diagrams/ModelComponentClassBetterOopDiagram.pptx
+++ b/docs/diagrams/ModelComponentClassBetterOopDiagram.pptx
@@ -1,6 +1,6 @@
 
 <file path=ppt/presentation.xml><?xml version="1.0" encoding="utf-8"?>
-<p:presentation xmlns:a="http://schemas.openxmlformats.org/drawingml/2006/main" xmlns:r="http://schemas.openxmlformats.org/officeDocument/2006/relationships" xmlns:p="http://schemas.openxmlformats.org/presentationml/2006/main" saveSubsetFonts="1">
+<p:presentation xmlns:a="http://schemas.openxmlformats.org/drawingml/2006/main" xmlns:r="http://schemas.openxmlformats.org/officeDocument/2006/relationships" xmlns:p="http://schemas.openxmlformats.org/presentationml/2006/main" removePersonalInfoOnSave="1" saveSubsetFonts="1">
   <p:sldMasterIdLst>
     <p:sldMasterId id="2147483648" r:id="rId1"/>
   </p:sldMasterIdLst>
@@ -208,7 +208,7 @@
           <a:p>
             <a:fld id="{F5CC4B3F-88C1-4FFA-B1B6-F41C21DC6924}" type="datetimeFigureOut">
               <a:rPr lang="en-US" smtClean="0"/>
-              <a:t>6/27/2018</a:t>
+              <a:t>12/5/2018</a:t>
             </a:fld>
             <a:endParaRPr lang="en-US"/>
           </a:p>
@@ -654,7 +654,7 @@
           <a:p>
             <a:fld id="{78C97017-6FC3-485B-9764-EAC9E56C1D49}" type="datetimeFigureOut">
               <a:rPr lang="en-US" smtClean="0"/>
-              <a:t>6/27/2018</a:t>
+              <a:t>12/5/2018</a:t>
             </a:fld>
             <a:endParaRPr lang="en-US"/>
           </a:p>
@@ -822,7 +822,7 @@
           <a:p>
             <a:fld id="{78C97017-6FC3-485B-9764-EAC9E56C1D49}" type="datetimeFigureOut">
               <a:rPr lang="en-US" smtClean="0"/>
-              <a:t>6/27/2018</a:t>
+              <a:t>12/5/2018</a:t>
             </a:fld>
             <a:endParaRPr lang="en-US"/>
           </a:p>
@@ -1000,7 +1000,7 @@
           <a:p>
             <a:fld id="{78C97017-6FC3-485B-9764-EAC9E56C1D49}" type="datetimeFigureOut">
               <a:rPr lang="en-US" smtClean="0"/>
-              <a:t>6/27/2018</a:t>
+              <a:t>12/5/2018</a:t>
             </a:fld>
             <a:endParaRPr lang="en-US"/>
           </a:p>
@@ -1168,7 +1168,7 @@
           <a:p>
             <a:fld id="{78C97017-6FC3-485B-9764-EAC9E56C1D49}" type="datetimeFigureOut">
               <a:rPr lang="en-US" smtClean="0"/>
-              <a:t>6/27/2018</a:t>
+              <a:t>12/5/2018</a:t>
             </a:fld>
             <a:endParaRPr lang="en-US"/>
           </a:p>
@@ -1413,7 +1413,7 @@
           <a:p>
             <a:fld id="{78C97017-6FC3-485B-9764-EAC9E56C1D49}" type="datetimeFigureOut">
               <a:rPr lang="en-US" smtClean="0"/>
-              <a:t>6/27/2018</a:t>
+              <a:t>12/5/2018</a:t>
             </a:fld>
             <a:endParaRPr lang="en-US"/>
           </a:p>
@@ -1698,7 +1698,7 @@
           <a:p>
             <a:fld id="{78C97017-6FC3-485B-9764-EAC9E56C1D49}" type="datetimeFigureOut">
               <a:rPr lang="en-US" smtClean="0"/>
-              <a:t>6/27/2018</a:t>
+              <a:t>12/5/2018</a:t>
             </a:fld>
             <a:endParaRPr lang="en-US"/>
           </a:p>
@@ -2117,7 +2117,7 @@
           <a:p>
             <a:fld id="{78C97017-6FC3-485B-9764-EAC9E56C1D49}" type="datetimeFigureOut">
               <a:rPr lang="en-US" smtClean="0"/>
-              <a:t>6/27/2018</a:t>
+              <a:t>12/5/2018</a:t>
             </a:fld>
             <a:endParaRPr lang="en-US"/>
           </a:p>
@@ -2234,7 +2234,7 @@
           <a:p>
             <a:fld id="{78C97017-6FC3-485B-9764-EAC9E56C1D49}" type="datetimeFigureOut">
               <a:rPr lang="en-US" smtClean="0"/>
-              <a:t>6/27/2018</a:t>
+              <a:t>12/5/2018</a:t>
             </a:fld>
             <a:endParaRPr lang="en-US"/>
           </a:p>
@@ -2329,7 +2329,7 @@
           <a:p>
             <a:fld id="{78C97017-6FC3-485B-9764-EAC9E56C1D49}" type="datetimeFigureOut">
               <a:rPr lang="en-US" smtClean="0"/>
-              <a:t>6/27/2018</a:t>
+              <a:t>12/5/2018</a:t>
             </a:fld>
             <a:endParaRPr lang="en-US"/>
           </a:p>
@@ -2604,7 +2604,7 @@
           <a:p>
             <a:fld id="{78C97017-6FC3-485B-9764-EAC9E56C1D49}" type="datetimeFigureOut">
               <a:rPr lang="en-US" smtClean="0"/>
-              <a:t>6/27/2018</a:t>
+              <a:t>12/5/2018</a:t>
             </a:fld>
             <a:endParaRPr lang="en-US"/>
           </a:p>
@@ -2856,7 +2856,7 @@
           <a:p>
             <a:fld id="{78C97017-6FC3-485B-9764-EAC9E56C1D49}" type="datetimeFigureOut">
               <a:rPr lang="en-US" smtClean="0"/>
-              <a:t>6/27/2018</a:t>
+              <a:t>12/5/2018</a:t>
             </a:fld>
             <a:endParaRPr lang="en-US"/>
           </a:p>
@@ -3067,7 +3067,7 @@
           <a:p>
             <a:fld id="{78C97017-6FC3-485B-9764-EAC9E56C1D49}" type="datetimeFigureOut">
               <a:rPr lang="en-US" smtClean="0"/>
-              <a:t>6/27/2018</a:t>
+              <a:t>12/5/2018</a:t>
             </a:fld>
             <a:endParaRPr lang="en-US"/>
           </a:p>
@@ -3444,58 +3444,53 @@
       </p:grpSpPr>
       <p:sp>
         <p:nvSpPr>
-          <p:cNvPr id="118" name="Rectangle 65"/>
+          <p:cNvPr id="46" name="Rectangle 8"/>
           <p:cNvSpPr/>
           <p:nvPr/>
         </p:nvSpPr>
         <p:spPr>
           <a:xfrm>
-            <a:off x="1119865" y="1676400"/>
-            <a:ext cx="7490735" cy="3059747"/>
-          </a:xfrm>
-          <a:prstGeom prst="roundRect">
-            <a:avLst>
-              <a:gd name="adj" fmla="val 3484"/>
-            </a:avLst>
+            <a:off x="1754912" y="3324621"/>
+            <a:ext cx="1447688" cy="346760"/>
+          </a:xfrm>
+          <a:prstGeom prst="rect">
+            <a:avLst/>
           </a:prstGeom>
-          <a:solidFill>
-            <a:schemeClr val="accent4">
-              <a:lumMod val="20000"/>
-              <a:lumOff val="80000"/>
-            </a:schemeClr>
-          </a:solidFill>
           <a:ln w="19050">
-            <a:noFill/>
+            <a:solidFill>
+              <a:srgbClr val="7030A0"/>
+            </a:solidFill>
           </a:ln>
           <a:effectLst/>
         </p:spPr>
         <p:style>
           <a:lnRef idx="1">
-            <a:schemeClr val="accent2"/>
+            <a:schemeClr val="accent4"/>
           </a:lnRef>
           <a:fillRef idx="2">
-            <a:schemeClr val="accent2"/>
+            <a:schemeClr val="accent4"/>
           </a:fillRef>
           <a:effectRef idx="1">
-            <a:schemeClr val="accent2"/>
+            <a:schemeClr val="accent4"/>
           </a:effectRef>
           <a:fontRef idx="minor">
             <a:schemeClr val="dk1"/>
           </a:fontRef>
         </p:style>
         <p:txBody>
-          <a:bodyPr rtlCol="0" anchor="t"/>
-          <a:lstStyle/>
-          <a:p>
-            <a:r>
-              <a:rPr lang="en-US" sz="1200" b="1" dirty="0">
+          <a:bodyPr rtlCol="0" anchor="ctr"/>
+          <a:lstStyle/>
+          <a:p>
+            <a:pPr algn="ctr"/>
+            <a:r>
+              <a:rPr lang="en-US" sz="1050" dirty="0" err="1">
                 <a:solidFill>
                   <a:srgbClr val="7030A0"/>
                 </a:solidFill>
               </a:rPr>
-              <a:t>Model</a:t>
-            </a:r>
-            <a:endParaRPr lang="en-SG" sz="1200" b="1" dirty="0">
+              <a:t>VersionedAddressBook</a:t>
+            </a:r>
+            <a:endParaRPr lang="en-SG" sz="1050" dirty="0">
               <a:solidFill>
                 <a:srgbClr val="7030A0"/>
               </a:solidFill>
@@ -3505,16 +3500,72 @@
       </p:sp>
       <p:sp>
         <p:nvSpPr>
-          <p:cNvPr id="2" name="Rectangle 8"/>
+          <p:cNvPr id="49" name="Rectangle 8"/>
           <p:cNvSpPr/>
           <p:nvPr/>
         </p:nvSpPr>
         <p:spPr>
           <a:xfrm>
-            <a:off x="2877180" y="3463240"/>
-            <a:ext cx="1093635" cy="346760"/>
+            <a:off x="3730715" y="3353144"/>
+            <a:ext cx="1156969" cy="346760"/>
           </a:xfrm>
           <a:prstGeom prst="rect">
+            <a:avLst/>
+          </a:prstGeom>
+          <a:ln w="19050">
+            <a:solidFill>
+              <a:srgbClr val="7030A0"/>
+            </a:solidFill>
+          </a:ln>
+          <a:effectLst/>
+        </p:spPr>
+        <p:style>
+          <a:lnRef idx="1">
+            <a:schemeClr val="accent4"/>
+          </a:lnRef>
+          <a:fillRef idx="2">
+            <a:schemeClr val="accent4"/>
+          </a:fillRef>
+          <a:effectRef idx="1">
+            <a:schemeClr val="accent4"/>
+          </a:effectRef>
+          <a:fontRef idx="minor">
+            <a:schemeClr val="dk1"/>
+          </a:fontRef>
+        </p:style>
+        <p:txBody>
+          <a:bodyPr rtlCol="0" anchor="ctr"/>
+          <a:lstStyle/>
+          <a:p>
+            <a:pPr algn="ctr"/>
+            <a:r>
+              <a:rPr lang="en-US" sz="1050" dirty="0" err="1">
+                <a:solidFill>
+                  <a:srgbClr val="7030A0"/>
+                </a:solidFill>
+              </a:rPr>
+              <a:t>UniquePersonList</a:t>
+            </a:r>
+            <a:endParaRPr lang="en-SG" sz="1050" dirty="0">
+              <a:solidFill>
+                <a:srgbClr val="7030A0"/>
+              </a:solidFill>
+            </a:endParaRPr>
+          </a:p>
+        </p:txBody>
+      </p:sp>
+      <p:sp>
+        <p:nvSpPr>
+          <p:cNvPr id="51" name="Flowchart: Decision 96"/>
+          <p:cNvSpPr/>
+          <p:nvPr/>
+        </p:nvSpPr>
+        <p:spPr>
+          <a:xfrm>
+            <a:off x="3201752" y="3437911"/>
+            <a:ext cx="236048" cy="173380"/>
+          </a:xfrm>
+          <a:prstGeom prst="flowChartDecision">
             <a:avLst/>
           </a:prstGeom>
           <a:solidFill>
@@ -3529,13 +3580,13 @@
         </p:spPr>
         <p:style>
           <a:lnRef idx="1">
-            <a:schemeClr val="accent2"/>
+            <a:schemeClr val="accent6"/>
           </a:lnRef>
           <a:fillRef idx="2">
-            <a:schemeClr val="accent2"/>
+            <a:schemeClr val="accent6"/>
           </a:fillRef>
           <a:effectRef idx="1">
-            <a:schemeClr val="accent2"/>
+            <a:schemeClr val="accent6"/>
           </a:effectRef>
           <a:fontRef idx="minor">
             <a:schemeClr val="dk1"/>
@@ -3546,104 +3597,31 @@
           <a:lstStyle/>
           <a:p>
             <a:pPr algn="ctr"/>
-            <a:r>
-              <a:rPr lang="en-US" sz="1050" dirty="0" err="1">
-                <a:solidFill>
-                  <a:schemeClr val="bg1"/>
-                </a:solidFill>
-              </a:rPr>
-              <a:t>UserPref</a:t>
-            </a:r>
-            <a:endParaRPr lang="en-SG" sz="1050" dirty="0">
-              <a:solidFill>
-                <a:schemeClr val="bg1"/>
-              </a:solidFill>
-            </a:endParaRPr>
-          </a:p>
-        </p:txBody>
-      </p:sp>
-      <p:sp>
-        <p:nvSpPr>
-          <p:cNvPr id="9" name="Rectangle 62"/>
-          <p:cNvSpPr/>
-          <p:nvPr/>
-        </p:nvSpPr>
-        <p:spPr>
-          <a:xfrm rot="16200000">
-            <a:off x="1661548" y="3097750"/>
-            <a:ext cx="1093635" cy="346760"/>
-          </a:xfrm>
-          <a:prstGeom prst="rect">
-            <a:avLst/>
-          </a:prstGeom>
-          <a:solidFill>
-            <a:srgbClr val="7030A0"/>
-          </a:solidFill>
-          <a:ln w="19050">
-            <a:solidFill>
-              <a:srgbClr val="7030A0"/>
-            </a:solidFill>
-          </a:ln>
-          <a:effectLst/>
-        </p:spPr>
-        <p:style>
-          <a:lnRef idx="1">
-            <a:schemeClr val="accent2"/>
-          </a:lnRef>
-          <a:fillRef idx="2">
-            <a:schemeClr val="accent2"/>
-          </a:fillRef>
-          <a:effectRef idx="1">
-            <a:schemeClr val="accent2"/>
-          </a:effectRef>
-          <a:fontRef idx="minor">
-            <a:schemeClr val="dk1"/>
-          </a:fontRef>
-        </p:style>
-        <p:txBody>
-          <a:bodyPr rtlCol="0" anchor="ctr"/>
-          <a:lstStyle/>
-          <a:p>
-            <a:pPr algn="ctr"/>
-            <a:r>
-              <a:rPr lang="en-US" sz="1050" dirty="0" err="1">
-                <a:solidFill>
-                  <a:schemeClr val="bg1"/>
-                </a:solidFill>
-              </a:rPr>
-              <a:t>ModelManager</a:t>
-            </a:r>
-            <a:endParaRPr lang="en-SG" sz="1050" dirty="0">
-              <a:solidFill>
-                <a:schemeClr val="bg1"/>
-              </a:solidFill>
-            </a:endParaRPr>
+            <a:endParaRPr lang="en-US" sz="1050"/>
           </a:p>
         </p:txBody>
       </p:sp>
       <p:cxnSp>
         <p:nvCxnSpPr>
-          <p:cNvPr id="107" name="Elbow Connector 106"/>
+          <p:cNvPr id="30" name="Elbow Connector 29"/>
           <p:cNvCxnSpPr>
-            <a:cxnSpLocks/>
+            <a:stCxn id="51" idx="3"/>
+            <a:endCxn id="49" idx="1"/>
           </p:cNvCxnSpPr>
           <p:nvPr/>
         </p:nvCxnSpPr>
         <p:spPr>
-          <a:xfrm rot="5400000" flipH="1" flipV="1">
-            <a:off x="4155901" y="1308943"/>
-            <a:ext cx="613122" cy="4459404"/>
+          <a:xfrm>
+            <a:off x="3437800" y="3524601"/>
+            <a:ext cx="292915" cy="1923"/>
           </a:xfrm>
           <a:prstGeom prst="bentConnector3">
-            <a:avLst>
-              <a:gd name="adj1" fmla="val -26668"/>
-            </a:avLst>
+            <a:avLst/>
           </a:prstGeom>
           <a:ln w="19050">
             <a:solidFill>
               <a:srgbClr val="7030A0"/>
             </a:solidFill>
-            <a:prstDash val="solid"/>
             <a:headEnd type="none" w="med" len="med"/>
             <a:tailEnd type="arrow" w="med" len="med"/>
           </a:ln>
@@ -3666,21 +3644,18 @@
       </p:cxnSp>
       <p:sp>
         <p:nvSpPr>
-          <p:cNvPr id="119" name="Rectangle 62"/>
+          <p:cNvPr id="62" name="Rectangle 8"/>
           <p:cNvSpPr/>
           <p:nvPr/>
         </p:nvSpPr>
         <p:spPr>
-          <a:xfrm rot="16200000">
-            <a:off x="956202" y="2861202"/>
-            <a:ext cx="1093635" cy="346760"/>
+          <a:xfrm>
+            <a:off x="5282183" y="3347776"/>
+            <a:ext cx="708186" cy="346760"/>
           </a:xfrm>
           <a:prstGeom prst="rect">
             <a:avLst/>
           </a:prstGeom>
-          <a:solidFill>
-            <a:srgbClr val="7030A0"/>
-          </a:solidFill>
           <a:ln w="19050">
             <a:solidFill>
               <a:srgbClr val="7030A0"/>
@@ -3690,13 +3665,13 @@
         </p:spPr>
         <p:style>
           <a:lnRef idx="1">
-            <a:schemeClr val="accent2"/>
+            <a:schemeClr val="accent4"/>
           </a:lnRef>
           <a:fillRef idx="2">
-            <a:schemeClr val="accent2"/>
+            <a:schemeClr val="accent4"/>
           </a:fillRef>
           <a:effectRef idx="1">
-            <a:schemeClr val="accent2"/>
+            <a:schemeClr val="accent4"/>
           </a:effectRef>
           <a:fontRef idx="minor">
             <a:schemeClr val="dk1"/>
@@ -3710,25 +3685,14 @@
             <a:r>
               <a:rPr lang="en-US" sz="1050" dirty="0">
                 <a:solidFill>
-                  <a:schemeClr val="bg1"/>
+                  <a:srgbClr val="7030A0"/>
                 </a:solidFill>
               </a:rPr>
-              <a:t>&lt;&lt;interface&gt;&gt;</a:t>
-            </a:r>
-          </a:p>
-          <a:p>
-            <a:pPr algn="ctr"/>
-            <a:r>
-              <a:rPr lang="en-US" sz="1050" dirty="0">
-                <a:solidFill>
-                  <a:schemeClr val="bg1"/>
-                </a:solidFill>
-              </a:rPr>
-              <a:t>Model</a:t>
+              <a:t>Person</a:t>
             </a:r>
             <a:endParaRPr lang="en-SG" sz="1050" dirty="0">
               <a:solidFill>
-                <a:schemeClr val="bg1"/>
+                <a:srgbClr val="7030A0"/>
               </a:solidFill>
             </a:endParaRPr>
           </a:p>
@@ -3736,21 +3700,19 @@
       </p:sp>
       <p:sp>
         <p:nvSpPr>
-          <p:cNvPr id="120" name="Isosceles Triangle 102"/>
+          <p:cNvPr id="63" name="Flowchart: Decision 96"/>
           <p:cNvSpPr/>
           <p:nvPr/>
         </p:nvSpPr>
         <p:spPr>
-          <a:xfrm rot="16200000">
-            <a:off x="1626910" y="2952291"/>
-            <a:ext cx="270504" cy="175523"/>
-          </a:xfrm>
-          <a:prstGeom prst="triangle">
+          <a:xfrm>
+            <a:off x="4886966" y="3430775"/>
+            <a:ext cx="236048" cy="173380"/>
+          </a:xfrm>
+          <a:prstGeom prst="flowChartDecision">
             <a:avLst/>
           </a:prstGeom>
-          <a:solidFill>
-            <a:srgbClr val="7030A0"/>
-          </a:solidFill>
+          <a:noFill/>
           <a:ln w="19050">
             <a:solidFill>
               <a:srgbClr val="7030A0"/>
@@ -3777,25 +3739,26 @@
           <a:lstStyle/>
           <a:p>
             <a:pPr algn="ctr"/>
-            <a:endParaRPr lang="en-SG" sz="1050"/>
+            <a:endParaRPr lang="en-US" sz="1050"/>
           </a:p>
         </p:txBody>
       </p:sp>
       <p:cxnSp>
         <p:nvCxnSpPr>
-          <p:cNvPr id="58" name="Straight Arrow Connector 57"/>
+          <p:cNvPr id="64" name="Elbow Connector 63"/>
           <p:cNvCxnSpPr>
-            <a:stCxn id="42" idx="3"/>
-            <a:endCxn id="2" idx="1"/>
+            <a:cxnSpLocks/>
+            <a:stCxn id="63" idx="3"/>
+            <a:endCxn id="62" idx="1"/>
           </p:cNvCxnSpPr>
           <p:nvPr/>
         </p:nvCxnSpPr>
         <p:spPr>
           <a:xfrm>
-            <a:off x="2609828" y="3636620"/>
-            <a:ext cx="267352" cy="0"/>
-          </a:xfrm>
-          <a:prstGeom prst="straightConnector1">
+            <a:off x="5123014" y="3517465"/>
+            <a:ext cx="159169" cy="3691"/>
+          </a:xfrm>
+          <a:prstGeom prst="bentConnector3">
             <a:avLst/>
           </a:prstGeom>
           <a:ln w="19050">
@@ -3822,29 +3785,129 @@
           </a:fontRef>
         </p:style>
       </p:cxnSp>
-      <p:cxnSp>
-        <p:nvCxnSpPr>
-          <p:cNvPr id="75" name="Elbow Connector 122"/>
-          <p:cNvCxnSpPr/>
+      <p:sp>
+        <p:nvSpPr>
+          <p:cNvPr id="76" name="Rectangle 8"/>
+          <p:cNvSpPr/>
           <p:nvPr/>
-        </p:nvCxnSpPr>
+        </p:nvSpPr>
         <p:spPr>
           <a:xfrm>
-            <a:off x="910091" y="3040053"/>
-            <a:ext cx="419548" cy="2860"/>
-          </a:xfrm>
-          <a:prstGeom prst="bentConnector3">
-            <a:avLst>
-              <a:gd name="adj1" fmla="val 50000"/>
-            </a:avLst>
+            <a:off x="6680903" y="3053948"/>
+            <a:ext cx="708186" cy="285783"/>
+          </a:xfrm>
+          <a:prstGeom prst="rect">
+            <a:avLst/>
           </a:prstGeom>
           <a:ln w="19050">
             <a:solidFill>
-              <a:schemeClr val="bg1">
-                <a:lumMod val="75000"/>
-              </a:schemeClr>
+              <a:srgbClr val="7030A0"/>
             </a:solidFill>
-            <a:prstDash val="sysDot"/>
+          </a:ln>
+          <a:effectLst/>
+        </p:spPr>
+        <p:style>
+          <a:lnRef idx="1">
+            <a:schemeClr val="accent4"/>
+          </a:lnRef>
+          <a:fillRef idx="2">
+            <a:schemeClr val="accent4"/>
+          </a:fillRef>
+          <a:effectRef idx="1">
+            <a:schemeClr val="accent4"/>
+          </a:effectRef>
+          <a:fontRef idx="minor">
+            <a:schemeClr val="dk1"/>
+          </a:fontRef>
+        </p:style>
+        <p:txBody>
+          <a:bodyPr rtlCol="0" anchor="ctr"/>
+          <a:lstStyle/>
+          <a:p>
+            <a:pPr algn="ctr"/>
+            <a:r>
+              <a:rPr lang="en-US" sz="1050" dirty="0">
+                <a:solidFill>
+                  <a:srgbClr val="7030A0"/>
+                </a:solidFill>
+              </a:rPr>
+              <a:t>Name</a:t>
+            </a:r>
+            <a:endParaRPr lang="en-SG" sz="1050" dirty="0">
+              <a:solidFill>
+                <a:srgbClr val="7030A0"/>
+              </a:solidFill>
+            </a:endParaRPr>
+          </a:p>
+        </p:txBody>
+      </p:sp>
+      <p:sp>
+        <p:nvSpPr>
+          <p:cNvPr id="78" name="Flowchart: Decision 96"/>
+          <p:cNvSpPr/>
+          <p:nvPr/>
+        </p:nvSpPr>
+        <p:spPr>
+          <a:xfrm>
+            <a:off x="6010453" y="3437911"/>
+            <a:ext cx="236048" cy="173380"/>
+          </a:xfrm>
+          <a:prstGeom prst="flowChartDecision">
+            <a:avLst/>
+          </a:prstGeom>
+          <a:solidFill>
+            <a:srgbClr val="7030A0"/>
+          </a:solidFill>
+          <a:ln w="19050">
+            <a:solidFill>
+              <a:srgbClr val="7030A0"/>
+            </a:solidFill>
+          </a:ln>
+          <a:effectLst/>
+        </p:spPr>
+        <p:style>
+          <a:lnRef idx="1">
+            <a:schemeClr val="accent6"/>
+          </a:lnRef>
+          <a:fillRef idx="2">
+            <a:schemeClr val="accent6"/>
+          </a:fillRef>
+          <a:effectRef idx="1">
+            <a:schemeClr val="accent6"/>
+          </a:effectRef>
+          <a:fontRef idx="minor">
+            <a:schemeClr val="dk1"/>
+          </a:fontRef>
+        </p:style>
+        <p:txBody>
+          <a:bodyPr rtlCol="0" anchor="ctr"/>
+          <a:lstStyle/>
+          <a:p>
+            <a:pPr algn="ctr"/>
+            <a:endParaRPr lang="en-US" sz="1050"/>
+          </a:p>
+        </p:txBody>
+      </p:sp>
+      <p:cxnSp>
+        <p:nvCxnSpPr>
+          <p:cNvPr id="79" name="Elbow Connector 78"/>
+          <p:cNvCxnSpPr>
+            <a:cxnSpLocks/>
+          </p:cNvCxnSpPr>
+          <p:nvPr/>
+        </p:nvCxnSpPr>
+        <p:spPr>
+          <a:xfrm flipV="1">
+            <a:off x="6246501" y="3196531"/>
+            <a:ext cx="434402" cy="327761"/>
+          </a:xfrm>
+          <a:prstGeom prst="bentConnector3">
+            <a:avLst/>
+          </a:prstGeom>
+          <a:ln w="19050">
+            <a:solidFill>
+              <a:srgbClr val="7030A0"/>
+            </a:solidFill>
             <a:headEnd type="none" w="med" len="med"/>
             <a:tailEnd type="arrow" w="med" len="med"/>
           </a:ln>
@@ -3865,29 +3928,85 @@
           </a:fontRef>
         </p:style>
       </p:cxnSp>
-      <p:cxnSp>
-        <p:nvCxnSpPr>
-          <p:cNvPr id="21" name="Straight Connector 20"/>
-          <p:cNvCxnSpPr>
-            <a:stCxn id="120" idx="3"/>
-          </p:cNvCxnSpPr>
+      <p:sp>
+        <p:nvSpPr>
+          <p:cNvPr id="80" name="Rectangle 8"/>
+          <p:cNvSpPr/>
           <p:nvPr/>
-        </p:nvCxnSpPr>
-        <p:spPr>
-          <a:xfrm flipV="1">
-            <a:off x="1849924" y="3040052"/>
-            <a:ext cx="216105" cy="1"/>
-          </a:xfrm>
-          <a:prstGeom prst="line">
+        </p:nvSpPr>
+        <p:spPr>
+          <a:xfrm>
+            <a:off x="6680903" y="3376926"/>
+            <a:ext cx="708186" cy="285783"/>
+          </a:xfrm>
+          <a:prstGeom prst="rect">
             <a:avLst/>
           </a:prstGeom>
           <a:ln w="19050">
             <a:solidFill>
               <a:srgbClr val="7030A0"/>
             </a:solidFill>
-            <a:prstDash val="sysDot"/>
+          </a:ln>
+          <a:effectLst/>
+        </p:spPr>
+        <p:style>
+          <a:lnRef idx="1">
+            <a:schemeClr val="accent4"/>
+          </a:lnRef>
+          <a:fillRef idx="2">
+            <a:schemeClr val="accent4"/>
+          </a:fillRef>
+          <a:effectRef idx="1">
+            <a:schemeClr val="accent4"/>
+          </a:effectRef>
+          <a:fontRef idx="minor">
+            <a:schemeClr val="dk1"/>
+          </a:fontRef>
+        </p:style>
+        <p:txBody>
+          <a:bodyPr rtlCol="0" anchor="ctr"/>
+          <a:lstStyle/>
+          <a:p>
+            <a:pPr algn="ctr"/>
+            <a:r>
+              <a:rPr lang="en-US" sz="1050" dirty="0">
+                <a:solidFill>
+                  <a:srgbClr val="7030A0"/>
+                </a:solidFill>
+              </a:rPr>
+              <a:t>Phone</a:t>
+            </a:r>
+            <a:endParaRPr lang="en-SG" sz="1050" dirty="0">
+              <a:solidFill>
+                <a:srgbClr val="7030A0"/>
+              </a:solidFill>
+            </a:endParaRPr>
+          </a:p>
+        </p:txBody>
+      </p:sp>
+      <p:cxnSp>
+        <p:nvCxnSpPr>
+          <p:cNvPr id="81" name="Elbow Connector 80"/>
+          <p:cNvCxnSpPr>
+            <a:stCxn id="78" idx="3"/>
+            <a:endCxn id="80" idx="1"/>
+          </p:cNvCxnSpPr>
+          <p:nvPr/>
+        </p:nvCxnSpPr>
+        <p:spPr>
+          <a:xfrm flipV="1">
+            <a:off x="6246501" y="3519818"/>
+            <a:ext cx="434402" cy="4783"/>
+          </a:xfrm>
+          <a:prstGeom prst="bentConnector3">
+            <a:avLst/>
+          </a:prstGeom>
+          <a:ln w="19050">
+            <a:solidFill>
+              <a:srgbClr val="7030A0"/>
+            </a:solidFill>
             <a:headEnd type="none" w="med" len="med"/>
-            <a:tailEnd type="none" w="med" len="med"/>
+            <a:tailEnd type="arrow" w="med" len="med"/>
           </a:ln>
           <a:effectLst/>
         </p:spPr>
@@ -3908,59 +4027,14 @@
       </p:cxnSp>
       <p:sp>
         <p:nvSpPr>
-          <p:cNvPr id="42" name="Flowchart: Decision 96"/>
+          <p:cNvPr id="83" name="Rectangle 8"/>
           <p:cNvSpPr/>
           <p:nvPr/>
         </p:nvSpPr>
         <p:spPr>
           <a:xfrm>
-            <a:off x="2373780" y="3549930"/>
-            <a:ext cx="236048" cy="173380"/>
-          </a:xfrm>
-          <a:prstGeom prst="flowChartDecision">
-            <a:avLst/>
-          </a:prstGeom>
-          <a:noFill/>
-          <a:ln w="19050">
-            <a:solidFill>
-              <a:srgbClr val="7030A0"/>
-            </a:solidFill>
-          </a:ln>
-          <a:effectLst/>
-        </p:spPr>
-        <p:style>
-          <a:lnRef idx="1">
-            <a:schemeClr val="accent6"/>
-          </a:lnRef>
-          <a:fillRef idx="2">
-            <a:schemeClr val="accent6"/>
-          </a:fillRef>
-          <a:effectRef idx="1">
-            <a:schemeClr val="accent6"/>
-          </a:effectRef>
-          <a:fontRef idx="minor">
-            <a:schemeClr val="dk1"/>
-          </a:fontRef>
-        </p:style>
-        <p:txBody>
-          <a:bodyPr rtlCol="0" anchor="ctr"/>
-          <a:lstStyle/>
-          <a:p>
-            <a:pPr algn="ctr"/>
-            <a:endParaRPr lang="en-US" sz="1050"/>
-          </a:p>
-        </p:txBody>
-      </p:sp>
-      <p:sp>
-        <p:nvSpPr>
-          <p:cNvPr id="46" name="Rectangle 8"/>
-          <p:cNvSpPr/>
-          <p:nvPr/>
-        </p:nvSpPr>
-        <p:spPr>
-          <a:xfrm>
-            <a:off x="2786406" y="2834911"/>
-            <a:ext cx="1447688" cy="346760"/>
+            <a:off x="6680903" y="3699904"/>
+            <a:ext cx="708186" cy="285783"/>
           </a:xfrm>
           <a:prstGeom prst="rect">
             <a:avLst/>
@@ -3992,12 +4066,12 @@
           <a:p>
             <a:pPr algn="ctr"/>
             <a:r>
-              <a:rPr lang="en-US" sz="1050" dirty="0" err="1" smtClean="0">
+              <a:rPr lang="en-US" sz="1050" dirty="0">
                 <a:solidFill>
                   <a:srgbClr val="7030A0"/>
                 </a:solidFill>
               </a:rPr>
-              <a:t>VersionedAddressBook</a:t>
+              <a:t>Email</a:t>
             </a:r>
             <a:endParaRPr lang="en-SG" sz="1050" dirty="0">
               <a:solidFill>
@@ -4009,19 +4083,19 @@
       </p:sp>
       <p:cxnSp>
         <p:nvCxnSpPr>
-          <p:cNvPr id="47" name="Straight Arrow Connector 46"/>
+          <p:cNvPr id="84" name="Elbow Connector 83"/>
           <p:cNvCxnSpPr>
-            <a:stCxn id="48" idx="3"/>
-            <a:endCxn id="46" idx="1"/>
+            <a:stCxn id="78" idx="3"/>
+            <a:endCxn id="83" idx="1"/>
           </p:cNvCxnSpPr>
           <p:nvPr/>
         </p:nvCxnSpPr>
         <p:spPr>
           <a:xfrm>
-            <a:off x="2624360" y="3003033"/>
-            <a:ext cx="162046" cy="5258"/>
-          </a:xfrm>
-          <a:prstGeom prst="straightConnector1">
+            <a:off x="6246501" y="3524601"/>
+            <a:ext cx="434402" cy="318195"/>
+          </a:xfrm>
+          <a:prstGeom prst="bentConnector3">
             <a:avLst/>
           </a:prstGeom>
           <a:ln w="19050">
@@ -4050,59 +4124,14 @@
       </p:cxnSp>
       <p:sp>
         <p:nvSpPr>
-          <p:cNvPr id="48" name="Flowchart: Decision 96"/>
+          <p:cNvPr id="85" name="Rectangle 8"/>
           <p:cNvSpPr/>
           <p:nvPr/>
         </p:nvSpPr>
         <p:spPr>
           <a:xfrm>
-            <a:off x="2388312" y="2916343"/>
-            <a:ext cx="236048" cy="173380"/>
-          </a:xfrm>
-          <a:prstGeom prst="flowChartDecision">
-            <a:avLst/>
-          </a:prstGeom>
-          <a:noFill/>
-          <a:ln w="19050">
-            <a:solidFill>
-              <a:srgbClr val="7030A0"/>
-            </a:solidFill>
-          </a:ln>
-          <a:effectLst/>
-        </p:spPr>
-        <p:style>
-          <a:lnRef idx="1">
-            <a:schemeClr val="accent6"/>
-          </a:lnRef>
-          <a:fillRef idx="2">
-            <a:schemeClr val="accent6"/>
-          </a:fillRef>
-          <a:effectRef idx="1">
-            <a:schemeClr val="accent6"/>
-          </a:effectRef>
-          <a:fontRef idx="minor">
-            <a:schemeClr val="dk1"/>
-          </a:fontRef>
-        </p:style>
-        <p:txBody>
-          <a:bodyPr rtlCol="0" anchor="ctr"/>
-          <a:lstStyle/>
-          <a:p>
-            <a:pPr algn="ctr"/>
-            <a:endParaRPr lang="en-US" sz="1050"/>
-          </a:p>
-        </p:txBody>
-      </p:sp>
-      <p:sp>
-        <p:nvSpPr>
-          <p:cNvPr id="49" name="Rectangle 8"/>
-          <p:cNvSpPr/>
-          <p:nvPr/>
-        </p:nvSpPr>
-        <p:spPr>
-          <a:xfrm>
-            <a:off x="4762209" y="2863434"/>
-            <a:ext cx="1156969" cy="346760"/>
+            <a:off x="6680903" y="4022881"/>
+            <a:ext cx="708186" cy="285783"/>
           </a:xfrm>
           <a:prstGeom prst="rect">
             <a:avLst/>
@@ -4134,12 +4163,12 @@
           <a:p>
             <a:pPr algn="ctr"/>
             <a:r>
-              <a:rPr lang="en-US" sz="1050" dirty="0" err="1">
+              <a:rPr lang="en-US" sz="1050" dirty="0">
                 <a:solidFill>
                   <a:srgbClr val="7030A0"/>
                 </a:solidFill>
               </a:rPr>
-              <a:t>UniquePersonList</a:t>
+              <a:t>Address</a:t>
             </a:r>
             <a:endParaRPr lang="en-SG" sz="1050" dirty="0">
               <a:solidFill>
@@ -4149,66 +4178,20 @@
           </a:p>
         </p:txBody>
       </p:sp>
-      <p:sp>
-        <p:nvSpPr>
-          <p:cNvPr id="51" name="Flowchart: Decision 96"/>
-          <p:cNvSpPr/>
-          <p:nvPr/>
-        </p:nvSpPr>
-        <p:spPr>
-          <a:xfrm>
-            <a:off x="4233246" y="2948201"/>
-            <a:ext cx="236048" cy="173380"/>
-          </a:xfrm>
-          <a:prstGeom prst="flowChartDecision">
-            <a:avLst/>
-          </a:prstGeom>
-          <a:solidFill>
-            <a:srgbClr val="7030A0"/>
-          </a:solidFill>
-          <a:ln w="19050">
-            <a:solidFill>
-              <a:srgbClr val="7030A0"/>
-            </a:solidFill>
-          </a:ln>
-          <a:effectLst/>
-        </p:spPr>
-        <p:style>
-          <a:lnRef idx="1">
-            <a:schemeClr val="accent6"/>
-          </a:lnRef>
-          <a:fillRef idx="2">
-            <a:schemeClr val="accent6"/>
-          </a:fillRef>
-          <a:effectRef idx="1">
-            <a:schemeClr val="accent6"/>
-          </a:effectRef>
-          <a:fontRef idx="minor">
-            <a:schemeClr val="dk1"/>
-          </a:fontRef>
-        </p:style>
-        <p:txBody>
-          <a:bodyPr rtlCol="0" anchor="ctr"/>
-          <a:lstStyle/>
-          <a:p>
-            <a:pPr algn="ctr"/>
-            <a:endParaRPr lang="en-US" sz="1050"/>
-          </a:p>
-        </p:txBody>
-      </p:sp>
       <p:cxnSp>
         <p:nvCxnSpPr>
-          <p:cNvPr id="30" name="Elbow Connector 29"/>
+          <p:cNvPr id="86" name="Elbow Connector 85"/>
           <p:cNvCxnSpPr>
-            <a:stCxn id="51" idx="3"/>
-            <a:endCxn id="49" idx="1"/>
+            <a:cxnSpLocks/>
+            <a:stCxn id="78" idx="3"/>
+            <a:endCxn id="85" idx="1"/>
           </p:cNvCxnSpPr>
           <p:nvPr/>
         </p:nvCxnSpPr>
         <p:spPr>
           <a:xfrm>
-            <a:off x="4469294" y="3034891"/>
-            <a:ext cx="292915" cy="1923"/>
+            <a:off x="6246501" y="3524601"/>
+            <a:ext cx="434402" cy="641172"/>
           </a:xfrm>
           <a:prstGeom prst="bentConnector3">
             <a:avLst/>
@@ -4239,750 +4222,13 @@
       </p:cxnSp>
       <p:sp>
         <p:nvSpPr>
-          <p:cNvPr id="62" name="Rectangle 8"/>
-          <p:cNvSpPr/>
-          <p:nvPr/>
-        </p:nvSpPr>
-        <p:spPr>
-          <a:xfrm>
-            <a:off x="6313677" y="2858066"/>
-            <a:ext cx="708186" cy="346760"/>
-          </a:xfrm>
-          <a:prstGeom prst="rect">
-            <a:avLst/>
-          </a:prstGeom>
-          <a:ln w="19050">
-            <a:solidFill>
-              <a:srgbClr val="7030A0"/>
-            </a:solidFill>
-          </a:ln>
-          <a:effectLst/>
-        </p:spPr>
-        <p:style>
-          <a:lnRef idx="1">
-            <a:schemeClr val="accent4"/>
-          </a:lnRef>
-          <a:fillRef idx="2">
-            <a:schemeClr val="accent4"/>
-          </a:fillRef>
-          <a:effectRef idx="1">
-            <a:schemeClr val="accent4"/>
-          </a:effectRef>
-          <a:fontRef idx="minor">
-            <a:schemeClr val="dk1"/>
-          </a:fontRef>
-        </p:style>
-        <p:txBody>
-          <a:bodyPr rtlCol="0" anchor="ctr"/>
-          <a:lstStyle/>
-          <a:p>
-            <a:pPr algn="ctr"/>
-            <a:r>
-              <a:rPr lang="en-US" sz="1050" dirty="0">
-                <a:solidFill>
-                  <a:srgbClr val="7030A0"/>
-                </a:solidFill>
-              </a:rPr>
-              <a:t>Person</a:t>
-            </a:r>
-            <a:endParaRPr lang="en-SG" sz="1050" dirty="0">
-              <a:solidFill>
-                <a:srgbClr val="7030A0"/>
-              </a:solidFill>
-            </a:endParaRPr>
-          </a:p>
-        </p:txBody>
-      </p:sp>
-      <p:sp>
-        <p:nvSpPr>
-          <p:cNvPr id="63" name="Flowchart: Decision 96"/>
-          <p:cNvSpPr/>
-          <p:nvPr/>
-        </p:nvSpPr>
-        <p:spPr>
-          <a:xfrm>
-            <a:off x="5918460" y="2941065"/>
-            <a:ext cx="236048" cy="173380"/>
-          </a:xfrm>
-          <a:prstGeom prst="flowChartDecision">
-            <a:avLst/>
-          </a:prstGeom>
-          <a:noFill/>
-          <a:ln w="19050">
-            <a:solidFill>
-              <a:srgbClr val="7030A0"/>
-            </a:solidFill>
-          </a:ln>
-          <a:effectLst/>
-        </p:spPr>
-        <p:style>
-          <a:lnRef idx="1">
-            <a:schemeClr val="accent6"/>
-          </a:lnRef>
-          <a:fillRef idx="2">
-            <a:schemeClr val="accent6"/>
-          </a:fillRef>
-          <a:effectRef idx="1">
-            <a:schemeClr val="accent6"/>
-          </a:effectRef>
-          <a:fontRef idx="minor">
-            <a:schemeClr val="dk1"/>
-          </a:fontRef>
-        </p:style>
-        <p:txBody>
-          <a:bodyPr rtlCol="0" anchor="ctr"/>
-          <a:lstStyle/>
-          <a:p>
-            <a:pPr algn="ctr"/>
-            <a:endParaRPr lang="en-US" sz="1050"/>
-          </a:p>
-        </p:txBody>
-      </p:sp>
-      <p:cxnSp>
-        <p:nvCxnSpPr>
-          <p:cNvPr id="64" name="Elbow Connector 63"/>
-          <p:cNvCxnSpPr>
-            <a:cxnSpLocks/>
-            <a:stCxn id="63" idx="3"/>
-            <a:endCxn id="62" idx="1"/>
-          </p:cNvCxnSpPr>
-          <p:nvPr/>
-        </p:nvCxnSpPr>
-        <p:spPr>
-          <a:xfrm>
-            <a:off x="6154508" y="3027755"/>
-            <a:ext cx="159169" cy="3691"/>
-          </a:xfrm>
-          <a:prstGeom prst="bentConnector3">
-            <a:avLst/>
-          </a:prstGeom>
-          <a:ln w="19050">
-            <a:solidFill>
-              <a:srgbClr val="7030A0"/>
-            </a:solidFill>
-            <a:headEnd type="none" w="med" len="med"/>
-            <a:tailEnd type="arrow" w="med" len="med"/>
-          </a:ln>
-          <a:effectLst/>
-        </p:spPr>
-        <p:style>
-          <a:lnRef idx="1">
-            <a:schemeClr val="accent2"/>
-          </a:lnRef>
-          <a:fillRef idx="2">
-            <a:schemeClr val="accent2"/>
-          </a:fillRef>
-          <a:effectRef idx="1">
-            <a:schemeClr val="accent2"/>
-          </a:effectRef>
-          <a:fontRef idx="minor">
-            <a:schemeClr val="dk1"/>
-          </a:fontRef>
-        </p:style>
-      </p:cxnSp>
-      <p:sp>
-        <p:nvSpPr>
-          <p:cNvPr id="76" name="Rectangle 8"/>
-          <p:cNvSpPr/>
-          <p:nvPr/>
-        </p:nvSpPr>
-        <p:spPr>
-          <a:xfrm>
-            <a:off x="7712397" y="2564238"/>
-            <a:ext cx="708186" cy="285783"/>
-          </a:xfrm>
-          <a:prstGeom prst="rect">
-            <a:avLst/>
-          </a:prstGeom>
-          <a:ln w="19050">
-            <a:solidFill>
-              <a:srgbClr val="7030A0"/>
-            </a:solidFill>
-          </a:ln>
-          <a:effectLst/>
-        </p:spPr>
-        <p:style>
-          <a:lnRef idx="1">
-            <a:schemeClr val="accent4"/>
-          </a:lnRef>
-          <a:fillRef idx="2">
-            <a:schemeClr val="accent4"/>
-          </a:fillRef>
-          <a:effectRef idx="1">
-            <a:schemeClr val="accent4"/>
-          </a:effectRef>
-          <a:fontRef idx="minor">
-            <a:schemeClr val="dk1"/>
-          </a:fontRef>
-        </p:style>
-        <p:txBody>
-          <a:bodyPr rtlCol="0" anchor="ctr"/>
-          <a:lstStyle/>
-          <a:p>
-            <a:pPr algn="ctr"/>
-            <a:r>
-              <a:rPr lang="en-US" sz="1050" dirty="0">
-                <a:solidFill>
-                  <a:srgbClr val="7030A0"/>
-                </a:solidFill>
-              </a:rPr>
-              <a:t>Name</a:t>
-            </a:r>
-            <a:endParaRPr lang="en-SG" sz="1050" dirty="0">
-              <a:solidFill>
-                <a:srgbClr val="7030A0"/>
-              </a:solidFill>
-            </a:endParaRPr>
-          </a:p>
-        </p:txBody>
-      </p:sp>
-      <p:sp>
-        <p:nvSpPr>
-          <p:cNvPr id="78" name="Flowchart: Decision 96"/>
-          <p:cNvSpPr/>
-          <p:nvPr/>
-        </p:nvSpPr>
-        <p:spPr>
-          <a:xfrm>
-            <a:off x="7041947" y="2948201"/>
-            <a:ext cx="236048" cy="173380"/>
-          </a:xfrm>
-          <a:prstGeom prst="flowChartDecision">
-            <a:avLst/>
-          </a:prstGeom>
-          <a:solidFill>
-            <a:srgbClr val="7030A0"/>
-          </a:solidFill>
-          <a:ln w="19050">
-            <a:solidFill>
-              <a:srgbClr val="7030A0"/>
-            </a:solidFill>
-          </a:ln>
-          <a:effectLst/>
-        </p:spPr>
-        <p:style>
-          <a:lnRef idx="1">
-            <a:schemeClr val="accent6"/>
-          </a:lnRef>
-          <a:fillRef idx="2">
-            <a:schemeClr val="accent6"/>
-          </a:fillRef>
-          <a:effectRef idx="1">
-            <a:schemeClr val="accent6"/>
-          </a:effectRef>
-          <a:fontRef idx="minor">
-            <a:schemeClr val="dk1"/>
-          </a:fontRef>
-        </p:style>
-        <p:txBody>
-          <a:bodyPr rtlCol="0" anchor="ctr"/>
-          <a:lstStyle/>
-          <a:p>
-            <a:pPr algn="ctr"/>
-            <a:endParaRPr lang="en-US" sz="1050"/>
-          </a:p>
-        </p:txBody>
-      </p:sp>
-      <p:cxnSp>
-        <p:nvCxnSpPr>
-          <p:cNvPr id="79" name="Elbow Connector 78"/>
-          <p:cNvCxnSpPr>
-            <a:cxnSpLocks/>
-          </p:cNvCxnSpPr>
-          <p:nvPr/>
-        </p:nvCxnSpPr>
-        <p:spPr>
-          <a:xfrm flipV="1">
-            <a:off x="7277995" y="2706821"/>
-            <a:ext cx="434402" cy="327761"/>
-          </a:xfrm>
-          <a:prstGeom prst="bentConnector3">
-            <a:avLst/>
-          </a:prstGeom>
-          <a:ln w="19050">
-            <a:solidFill>
-              <a:srgbClr val="7030A0"/>
-            </a:solidFill>
-            <a:headEnd type="none" w="med" len="med"/>
-            <a:tailEnd type="arrow" w="med" len="med"/>
-          </a:ln>
-          <a:effectLst/>
-        </p:spPr>
-        <p:style>
-          <a:lnRef idx="1">
-            <a:schemeClr val="accent2"/>
-          </a:lnRef>
-          <a:fillRef idx="2">
-            <a:schemeClr val="accent2"/>
-          </a:fillRef>
-          <a:effectRef idx="1">
-            <a:schemeClr val="accent2"/>
-          </a:effectRef>
-          <a:fontRef idx="minor">
-            <a:schemeClr val="dk1"/>
-          </a:fontRef>
-        </p:style>
-      </p:cxnSp>
-      <p:sp>
-        <p:nvSpPr>
-          <p:cNvPr id="80" name="Rectangle 8"/>
-          <p:cNvSpPr/>
-          <p:nvPr/>
-        </p:nvSpPr>
-        <p:spPr>
-          <a:xfrm>
-            <a:off x="7712397" y="2887216"/>
-            <a:ext cx="708186" cy="285783"/>
-          </a:xfrm>
-          <a:prstGeom prst="rect">
-            <a:avLst/>
-          </a:prstGeom>
-          <a:ln w="19050">
-            <a:solidFill>
-              <a:srgbClr val="7030A0"/>
-            </a:solidFill>
-          </a:ln>
-          <a:effectLst/>
-        </p:spPr>
-        <p:style>
-          <a:lnRef idx="1">
-            <a:schemeClr val="accent4"/>
-          </a:lnRef>
-          <a:fillRef idx="2">
-            <a:schemeClr val="accent4"/>
-          </a:fillRef>
-          <a:effectRef idx="1">
-            <a:schemeClr val="accent4"/>
-          </a:effectRef>
-          <a:fontRef idx="minor">
-            <a:schemeClr val="dk1"/>
-          </a:fontRef>
-        </p:style>
-        <p:txBody>
-          <a:bodyPr rtlCol="0" anchor="ctr"/>
-          <a:lstStyle/>
-          <a:p>
-            <a:pPr algn="ctr"/>
-            <a:r>
-              <a:rPr lang="en-US" sz="1050" dirty="0">
-                <a:solidFill>
-                  <a:srgbClr val="7030A0"/>
-                </a:solidFill>
-              </a:rPr>
-              <a:t>Phone</a:t>
-            </a:r>
-            <a:endParaRPr lang="en-SG" sz="1050" dirty="0">
-              <a:solidFill>
-                <a:srgbClr val="7030A0"/>
-              </a:solidFill>
-            </a:endParaRPr>
-          </a:p>
-        </p:txBody>
-      </p:sp>
-      <p:cxnSp>
-        <p:nvCxnSpPr>
-          <p:cNvPr id="81" name="Elbow Connector 80"/>
-          <p:cNvCxnSpPr>
-            <a:stCxn id="78" idx="3"/>
-            <a:endCxn id="80" idx="1"/>
-          </p:cNvCxnSpPr>
-          <p:nvPr/>
-        </p:nvCxnSpPr>
-        <p:spPr>
-          <a:xfrm flipV="1">
-            <a:off x="7277995" y="3030108"/>
-            <a:ext cx="434402" cy="4783"/>
-          </a:xfrm>
-          <a:prstGeom prst="bentConnector3">
-            <a:avLst/>
-          </a:prstGeom>
-          <a:ln w="19050">
-            <a:solidFill>
-              <a:srgbClr val="7030A0"/>
-            </a:solidFill>
-            <a:headEnd type="none" w="med" len="med"/>
-            <a:tailEnd type="arrow" w="med" len="med"/>
-          </a:ln>
-          <a:effectLst/>
-        </p:spPr>
-        <p:style>
-          <a:lnRef idx="1">
-            <a:schemeClr val="accent2"/>
-          </a:lnRef>
-          <a:fillRef idx="2">
-            <a:schemeClr val="accent2"/>
-          </a:fillRef>
-          <a:effectRef idx="1">
-            <a:schemeClr val="accent2"/>
-          </a:effectRef>
-          <a:fontRef idx="minor">
-            <a:schemeClr val="dk1"/>
-          </a:fontRef>
-        </p:style>
-      </p:cxnSp>
-      <p:sp>
-        <p:nvSpPr>
-          <p:cNvPr id="83" name="Rectangle 8"/>
-          <p:cNvSpPr/>
-          <p:nvPr/>
-        </p:nvSpPr>
-        <p:spPr>
-          <a:xfrm>
-            <a:off x="7712397" y="3210194"/>
-            <a:ext cx="708186" cy="285783"/>
-          </a:xfrm>
-          <a:prstGeom prst="rect">
-            <a:avLst/>
-          </a:prstGeom>
-          <a:ln w="19050">
-            <a:solidFill>
-              <a:srgbClr val="7030A0"/>
-            </a:solidFill>
-          </a:ln>
-          <a:effectLst/>
-        </p:spPr>
-        <p:style>
-          <a:lnRef idx="1">
-            <a:schemeClr val="accent4"/>
-          </a:lnRef>
-          <a:fillRef idx="2">
-            <a:schemeClr val="accent4"/>
-          </a:fillRef>
-          <a:effectRef idx="1">
-            <a:schemeClr val="accent4"/>
-          </a:effectRef>
-          <a:fontRef idx="minor">
-            <a:schemeClr val="dk1"/>
-          </a:fontRef>
-        </p:style>
-        <p:txBody>
-          <a:bodyPr rtlCol="0" anchor="ctr"/>
-          <a:lstStyle/>
-          <a:p>
-            <a:pPr algn="ctr"/>
-            <a:r>
-              <a:rPr lang="en-US" sz="1050" dirty="0">
-                <a:solidFill>
-                  <a:srgbClr val="7030A0"/>
-                </a:solidFill>
-              </a:rPr>
-              <a:t>Email</a:t>
-            </a:r>
-            <a:endParaRPr lang="en-SG" sz="1050" dirty="0">
-              <a:solidFill>
-                <a:srgbClr val="7030A0"/>
-              </a:solidFill>
-            </a:endParaRPr>
-          </a:p>
-        </p:txBody>
-      </p:sp>
-      <p:cxnSp>
-        <p:nvCxnSpPr>
-          <p:cNvPr id="84" name="Elbow Connector 83"/>
-          <p:cNvCxnSpPr>
-            <a:stCxn id="78" idx="3"/>
-            <a:endCxn id="83" idx="1"/>
-          </p:cNvCxnSpPr>
-          <p:nvPr/>
-        </p:nvCxnSpPr>
-        <p:spPr>
-          <a:xfrm>
-            <a:off x="7277995" y="3034891"/>
-            <a:ext cx="434402" cy="318195"/>
-          </a:xfrm>
-          <a:prstGeom prst="bentConnector3">
-            <a:avLst/>
-          </a:prstGeom>
-          <a:ln w="19050">
-            <a:solidFill>
-              <a:srgbClr val="7030A0"/>
-            </a:solidFill>
-            <a:headEnd type="none" w="med" len="med"/>
-            <a:tailEnd type="arrow" w="med" len="med"/>
-          </a:ln>
-          <a:effectLst/>
-        </p:spPr>
-        <p:style>
-          <a:lnRef idx="1">
-            <a:schemeClr val="accent2"/>
-          </a:lnRef>
-          <a:fillRef idx="2">
-            <a:schemeClr val="accent2"/>
-          </a:fillRef>
-          <a:effectRef idx="1">
-            <a:schemeClr val="accent2"/>
-          </a:effectRef>
-          <a:fontRef idx="minor">
-            <a:schemeClr val="dk1"/>
-          </a:fontRef>
-        </p:style>
-      </p:cxnSp>
-      <p:sp>
-        <p:nvSpPr>
-          <p:cNvPr id="85" name="Rectangle 8"/>
-          <p:cNvSpPr/>
-          <p:nvPr/>
-        </p:nvSpPr>
-        <p:spPr>
-          <a:xfrm>
-            <a:off x="7712397" y="3533171"/>
-            <a:ext cx="708186" cy="285783"/>
-          </a:xfrm>
-          <a:prstGeom prst="rect">
-            <a:avLst/>
-          </a:prstGeom>
-          <a:ln w="19050">
-            <a:solidFill>
-              <a:srgbClr val="7030A0"/>
-            </a:solidFill>
-          </a:ln>
-          <a:effectLst/>
-        </p:spPr>
-        <p:style>
-          <a:lnRef idx="1">
-            <a:schemeClr val="accent4"/>
-          </a:lnRef>
-          <a:fillRef idx="2">
-            <a:schemeClr val="accent4"/>
-          </a:fillRef>
-          <a:effectRef idx="1">
-            <a:schemeClr val="accent4"/>
-          </a:effectRef>
-          <a:fontRef idx="minor">
-            <a:schemeClr val="dk1"/>
-          </a:fontRef>
-        </p:style>
-        <p:txBody>
-          <a:bodyPr rtlCol="0" anchor="ctr"/>
-          <a:lstStyle/>
-          <a:p>
-            <a:pPr algn="ctr"/>
-            <a:r>
-              <a:rPr lang="en-US" sz="1050" dirty="0">
-                <a:solidFill>
-                  <a:srgbClr val="7030A0"/>
-                </a:solidFill>
-              </a:rPr>
-              <a:t>Address</a:t>
-            </a:r>
-            <a:endParaRPr lang="en-SG" sz="1050" dirty="0">
-              <a:solidFill>
-                <a:srgbClr val="7030A0"/>
-              </a:solidFill>
-            </a:endParaRPr>
-          </a:p>
-        </p:txBody>
-      </p:sp>
-      <p:cxnSp>
-        <p:nvCxnSpPr>
-          <p:cNvPr id="86" name="Elbow Connector 85"/>
-          <p:cNvCxnSpPr>
-            <a:stCxn id="78" idx="3"/>
-            <a:endCxn id="85" idx="1"/>
-          </p:cNvCxnSpPr>
-          <p:nvPr/>
-        </p:nvCxnSpPr>
-        <p:spPr>
-          <a:xfrm>
-            <a:off x="7277995" y="3034891"/>
-            <a:ext cx="434402" cy="641172"/>
-          </a:xfrm>
-          <a:prstGeom prst="bentConnector3">
-            <a:avLst/>
-          </a:prstGeom>
-          <a:ln w="19050">
-            <a:solidFill>
-              <a:srgbClr val="7030A0"/>
-            </a:solidFill>
-            <a:headEnd type="none" w="med" len="med"/>
-            <a:tailEnd type="arrow" w="med" len="med"/>
-          </a:ln>
-          <a:effectLst/>
-        </p:spPr>
-        <p:style>
-          <a:lnRef idx="1">
-            <a:schemeClr val="accent2"/>
-          </a:lnRef>
-          <a:fillRef idx="2">
-            <a:schemeClr val="accent2"/>
-          </a:fillRef>
-          <a:effectRef idx="1">
-            <a:schemeClr val="accent2"/>
-          </a:effectRef>
-          <a:fontRef idx="minor">
-            <a:schemeClr val="dk1"/>
-          </a:fontRef>
-        </p:style>
-      </p:cxnSp>
-      <p:sp>
-        <p:nvSpPr>
-          <p:cNvPr id="114" name="TextBox 113"/>
-          <p:cNvSpPr txBox="1"/>
-          <p:nvPr/>
-        </p:nvSpPr>
-        <p:spPr>
-          <a:xfrm rot="16200000">
-            <a:off x="6362886" y="3586305"/>
-            <a:ext cx="881018" cy="261610"/>
-          </a:xfrm>
-          <a:prstGeom prst="rect">
-            <a:avLst/>
-          </a:prstGeom>
-          <a:noFill/>
-        </p:spPr>
-        <p:txBody>
-          <a:bodyPr wrap="square" rtlCol="0">
-            <a:spAutoFit/>
-          </a:bodyPr>
-          <a:lstStyle/>
-          <a:p>
-            <a:pPr algn="r"/>
-            <a:r>
-              <a:rPr lang="en-US" sz="1100" dirty="0">
-                <a:solidFill>
-                  <a:srgbClr val="7030A0"/>
-                </a:solidFill>
-              </a:rPr>
-              <a:t>filtered list</a:t>
-            </a:r>
-            <a:endParaRPr lang="en-SG" sz="1100" dirty="0">
-              <a:solidFill>
-                <a:srgbClr val="7030A0"/>
-              </a:solidFill>
-            </a:endParaRPr>
-          </a:p>
-        </p:txBody>
-      </p:sp>
-      <p:sp>
-        <p:nvSpPr>
-          <p:cNvPr id="122" name="Rectangle 8"/>
-          <p:cNvSpPr/>
-          <p:nvPr/>
-        </p:nvSpPr>
-        <p:spPr>
-          <a:xfrm>
-            <a:off x="2057401" y="4239491"/>
-            <a:ext cx="1066800" cy="346760"/>
-          </a:xfrm>
-          <a:prstGeom prst="rect">
-            <a:avLst/>
-          </a:prstGeom>
-          <a:ln w="19050">
-            <a:solidFill>
-              <a:srgbClr val="7030A0"/>
-            </a:solidFill>
-          </a:ln>
-          <a:effectLst/>
-        </p:spPr>
-        <p:style>
-          <a:lnRef idx="1">
-            <a:schemeClr val="accent4"/>
-          </a:lnRef>
-          <a:fillRef idx="2">
-            <a:schemeClr val="accent4"/>
-          </a:fillRef>
-          <a:effectRef idx="1">
-            <a:schemeClr val="accent4"/>
-          </a:effectRef>
-          <a:fontRef idx="minor">
-            <a:schemeClr val="dk1"/>
-          </a:fontRef>
-        </p:style>
-        <p:txBody>
-          <a:bodyPr rtlCol="0" anchor="ctr"/>
-          <a:lstStyle/>
-          <a:p>
-            <a:pPr algn="ctr"/>
-            <a:r>
-              <a:rPr lang="en-US" sz="1050" dirty="0">
-                <a:solidFill>
-                  <a:srgbClr val="7030A0"/>
-                </a:solidFill>
-              </a:rPr>
-              <a:t>&lt;&lt;interface&gt;&gt;</a:t>
-            </a:r>
-            <a:r>
-              <a:rPr lang="en-US" sz="1050">
-                <a:solidFill>
-                  <a:srgbClr val="7030A0"/>
-                </a:solidFill>
-              </a:rPr>
-              <a:t/>
-            </a:r>
-            <a:br>
-              <a:rPr lang="en-US" sz="1050">
-                <a:solidFill>
-                  <a:srgbClr val="7030A0"/>
-                </a:solidFill>
-              </a:rPr>
-            </a:br>
-            <a:r>
-              <a:rPr lang="en-US" sz="1050" dirty="0" err="1">
-                <a:solidFill>
-                  <a:srgbClr val="7030A0"/>
-                </a:solidFill>
-              </a:rPr>
-              <a:t>ObservableList</a:t>
-            </a:r>
-            <a:endParaRPr lang="en-SG" sz="1050" dirty="0">
-              <a:solidFill>
-                <a:srgbClr val="7030A0"/>
-              </a:solidFill>
-            </a:endParaRPr>
-          </a:p>
-        </p:txBody>
-      </p:sp>
-      <p:cxnSp>
-        <p:nvCxnSpPr>
-          <p:cNvPr id="124" name="Elbow Connector 122"/>
-          <p:cNvCxnSpPr>
-            <a:stCxn id="119" idx="1"/>
-            <a:endCxn id="122" idx="1"/>
-          </p:cNvCxnSpPr>
-          <p:nvPr/>
-        </p:nvCxnSpPr>
-        <p:spPr>
-          <a:xfrm rot="16200000" flipH="1">
-            <a:off x="1364475" y="3719944"/>
-            <a:ext cx="831471" cy="554381"/>
-          </a:xfrm>
-          <a:prstGeom prst="bentConnector2">
-            <a:avLst/>
-          </a:prstGeom>
-          <a:ln w="19050">
-            <a:solidFill>
-              <a:srgbClr val="7030A0"/>
-            </a:solidFill>
-            <a:prstDash val="sysDot"/>
-            <a:headEnd type="none" w="med" len="med"/>
-            <a:tailEnd type="arrow" w="med" len="med"/>
-          </a:ln>
-          <a:effectLst/>
-        </p:spPr>
-        <p:style>
-          <a:lnRef idx="1">
-            <a:schemeClr val="accent2"/>
-          </a:lnRef>
-          <a:fillRef idx="2">
-            <a:schemeClr val="accent2"/>
-          </a:fillRef>
-          <a:effectRef idx="1">
-            <a:schemeClr val="accent2"/>
-          </a:effectRef>
-          <a:fontRef idx="minor">
-            <a:schemeClr val="dk1"/>
-          </a:fontRef>
-        </p:style>
-      </p:cxnSp>
-      <p:sp>
-        <p:nvSpPr>
           <p:cNvPr id="54" name="TextBox 53"/>
           <p:cNvSpPr txBox="1"/>
           <p:nvPr/>
         </p:nvSpPr>
         <p:spPr>
           <a:xfrm>
-            <a:off x="4324972" y="3058864"/>
+            <a:off x="3293478" y="3548574"/>
             <a:ext cx="189257" cy="178683"/>
           </a:xfrm>
           <a:prstGeom prst="rect">
@@ -5021,7 +4267,7 @@
         </p:nvSpPr>
         <p:spPr>
           <a:xfrm>
-            <a:off x="6135256" y="3097917"/>
+            <a:off x="5103762" y="3587627"/>
             <a:ext cx="189257" cy="178683"/>
           </a:xfrm>
           <a:prstGeom prst="rect">
@@ -5043,123 +4289,6 @@
                 </a:solidFill>
               </a:rPr>
               <a:t>*</a:t>
-            </a:r>
-            <a:endParaRPr lang="en-SG" sz="1100" dirty="0">
-              <a:solidFill>
-                <a:srgbClr val="7030A0"/>
-              </a:solidFill>
-            </a:endParaRPr>
-          </a:p>
-        </p:txBody>
-      </p:sp>
-      <p:sp>
-        <p:nvSpPr>
-          <p:cNvPr id="65" name="TextBox 64"/>
-          <p:cNvSpPr txBox="1"/>
-          <p:nvPr/>
-        </p:nvSpPr>
-        <p:spPr>
-          <a:xfrm>
-            <a:off x="2560167" y="2753818"/>
-            <a:ext cx="78378" cy="193767"/>
-          </a:xfrm>
-          <a:prstGeom prst="rect">
-            <a:avLst/>
-          </a:prstGeom>
-          <a:noFill/>
-        </p:spPr>
-        <p:txBody>
-          <a:bodyPr wrap="square" lIns="0" tIns="0" rIns="0" bIns="0" rtlCol="0">
-            <a:noAutofit/>
-          </a:bodyPr>
-          <a:lstStyle/>
-          <a:p>
-            <a:pPr algn="ctr"/>
-            <a:r>
-              <a:rPr lang="en-US" sz="1100" dirty="0">
-                <a:solidFill>
-                  <a:srgbClr val="7030A0"/>
-                </a:solidFill>
-              </a:rPr>
-              <a:t>1</a:t>
-            </a:r>
-            <a:endParaRPr lang="en-SG" sz="1100" dirty="0">
-              <a:solidFill>
-                <a:srgbClr val="7030A0"/>
-              </a:solidFill>
-            </a:endParaRPr>
-          </a:p>
-        </p:txBody>
-      </p:sp>
-      <p:sp>
-        <p:nvSpPr>
-          <p:cNvPr id="66" name="TextBox 65"/>
-          <p:cNvSpPr txBox="1"/>
-          <p:nvPr/>
-        </p:nvSpPr>
-        <p:spPr>
-          <a:xfrm>
-            <a:off x="2707070" y="3667737"/>
-            <a:ext cx="189257" cy="178683"/>
-          </a:xfrm>
-          <a:prstGeom prst="rect">
-            <a:avLst/>
-          </a:prstGeom>
-          <a:noFill/>
-        </p:spPr>
-        <p:txBody>
-          <a:bodyPr wrap="square" lIns="0" tIns="0" rIns="0" bIns="0" rtlCol="0">
-            <a:noAutofit/>
-          </a:bodyPr>
-          <a:lstStyle/>
-          <a:p>
-            <a:pPr algn="ctr"/>
-            <a:r>
-              <a:rPr lang="en-US" sz="1100" dirty="0">
-                <a:solidFill>
-                  <a:srgbClr val="7030A0"/>
-                </a:solidFill>
-              </a:rPr>
-              <a:t>1</a:t>
-            </a:r>
-            <a:endParaRPr lang="en-SG" sz="1100" dirty="0">
-              <a:solidFill>
-                <a:srgbClr val="7030A0"/>
-              </a:solidFill>
-            </a:endParaRPr>
-          </a:p>
-        </p:txBody>
-      </p:sp>
-      <p:sp>
-        <p:nvSpPr>
-          <p:cNvPr id="70" name="TextBox 69"/>
-          <p:cNvSpPr txBox="1"/>
-          <p:nvPr/>
-        </p:nvSpPr>
-        <p:spPr>
-          <a:xfrm>
-            <a:off x="6449896" y="3204826"/>
-            <a:ext cx="189257" cy="178683"/>
-          </a:xfrm>
-          <a:prstGeom prst="rect">
-            <a:avLst/>
-          </a:prstGeom>
-          <a:noFill/>
-        </p:spPr>
-        <p:txBody>
-          <a:bodyPr wrap="square" lIns="0" tIns="0" rIns="0" bIns="0" rtlCol="0">
-            <a:noAutofit/>
-          </a:bodyPr>
-          <a:lstStyle/>
-          <a:p>
-            <a:pPr algn="ctr"/>
-            <a:r>
-              <a:rPr lang="en-US" sz="1100" dirty="0">
-                <a:solidFill>
-                  <a:srgbClr val="7030A0"/>
-                </a:solidFill>
-              </a:rPr>
-              <a:t>1</a:t>
             </a:r>
             <a:endParaRPr lang="en-SG" sz="1100" dirty="0">
               <a:solidFill>
@@ -5183,7 +4312,7 @@
         </p:nvSpPr>
         <p:spPr>
           <a:xfrm>
-            <a:off x="4755872" y="2206861"/>
+            <a:off x="3724378" y="2696571"/>
             <a:ext cx="1156969" cy="285783"/>
           </a:xfrm>
           <a:prstGeom prst="rect">
@@ -5249,7 +4378,7 @@
         </p:nvCxnSpPr>
         <p:spPr>
           <a:xfrm rot="5400000" flipH="1" flipV="1">
-            <a:off x="4233181" y="2536174"/>
+            <a:off x="3201687" y="3025884"/>
             <a:ext cx="709111" cy="336271"/>
           </a:xfrm>
           <a:prstGeom prst="bentConnector2">
@@ -5293,7 +4422,7 @@
         </p:nvSpPr>
         <p:spPr>
           <a:xfrm>
-            <a:off x="6714344" y="2430721"/>
+            <a:off x="5682850" y="2920431"/>
             <a:ext cx="189257" cy="178683"/>
           </a:xfrm>
           <a:prstGeom prst="rect">
@@ -5338,7 +4467,7 @@
         </p:nvSpPr>
         <p:spPr>
           <a:xfrm rot="16200000">
-            <a:off x="6553482" y="2664721"/>
+            <a:off x="5521988" y="3154431"/>
             <a:ext cx="236048" cy="173380"/>
           </a:xfrm>
           <a:prstGeom prst="flowChartDecision">
@@ -5392,7 +4521,7 @@
         </p:nvCxnSpPr>
         <p:spPr>
           <a:xfrm flipV="1">
-            <a:off x="5884280" y="2233006"/>
+            <a:off x="4852786" y="2722716"/>
             <a:ext cx="432916" cy="111294"/>
           </a:xfrm>
           <a:prstGeom prst="bentConnector3">
@@ -5436,7 +4565,7 @@
         </p:nvSpPr>
         <p:spPr>
           <a:xfrm>
-            <a:off x="6317196" y="2059626"/>
+            <a:off x="5285702" y="2549336"/>
             <a:ext cx="708186" cy="346760"/>
           </a:xfrm>
           <a:prstGeom prst="rect">
@@ -5498,7 +4627,7 @@
         </p:nvSpPr>
         <p:spPr>
           <a:xfrm>
-            <a:off x="6135256" y="2278014"/>
+            <a:off x="5103762" y="2767724"/>
             <a:ext cx="189257" cy="178683"/>
           </a:xfrm>
           <a:prstGeom prst="rect">
@@ -5543,7 +4672,7 @@
         </p:nvSpPr>
         <p:spPr>
           <a:xfrm>
-            <a:off x="4367100" y="2172972"/>
+            <a:off x="3335606" y="2662682"/>
             <a:ext cx="189257" cy="178683"/>
           </a:xfrm>
           <a:prstGeom prst="rect">
@@ -5588,7 +4717,7 @@
         </p:nvSpPr>
         <p:spPr>
           <a:xfrm>
-            <a:off x="5911329" y="2262081"/>
+            <a:off x="4879835" y="2751791"/>
             <a:ext cx="236048" cy="173380"/>
           </a:xfrm>
           <a:prstGeom prst="flowChartDecision">
@@ -5645,7 +4774,7 @@
         </p:nvCxnSpPr>
         <p:spPr>
           <a:xfrm rot="16200000" flipV="1">
-            <a:off x="6557898" y="2519778"/>
+            <a:off x="5526404" y="3009488"/>
             <a:ext cx="227001" cy="217"/>
           </a:xfrm>
           <a:prstGeom prst="bentConnector3">
@@ -5659,320 +4788,6 @@
             </a:solidFill>
             <a:headEnd type="none" w="med" len="med"/>
             <a:tailEnd type="arrow" w="med" len="med"/>
-          </a:ln>
-          <a:effectLst/>
-        </p:spPr>
-        <p:style>
-          <a:lnRef idx="1">
-            <a:schemeClr val="accent2"/>
-          </a:lnRef>
-          <a:fillRef idx="2">
-            <a:schemeClr val="accent2"/>
-          </a:fillRef>
-          <a:effectRef idx="1">
-            <a:schemeClr val="accent2"/>
-          </a:effectRef>
-          <a:fontRef idx="minor">
-            <a:schemeClr val="dk1"/>
-          </a:fontRef>
-        </p:style>
-      </p:cxnSp>
-      <p:cxnSp>
-        <p:nvCxnSpPr>
-          <p:cNvPr id="90" name="Elbow Connector 63"/>
-          <p:cNvCxnSpPr>
-            <a:stCxn id="91" idx="3"/>
-          </p:cNvCxnSpPr>
-          <p:nvPr/>
-        </p:nvCxnSpPr>
-        <p:spPr>
-          <a:xfrm rot="5400000">
-            <a:off x="3470636" y="2687353"/>
-            <a:ext cx="293825" cy="5938"/>
-          </a:xfrm>
-          <a:prstGeom prst="bentConnector3">
-            <a:avLst>
-              <a:gd name="adj1" fmla="val 50000"/>
-            </a:avLst>
-          </a:prstGeom>
-          <a:ln w="19050">
-            <a:solidFill>
-              <a:srgbClr val="7030A0"/>
-            </a:solidFill>
-            <a:prstDash val="sysDot"/>
-            <a:headEnd type="none" w="med" len="med"/>
-            <a:tailEnd type="none" w="med" len="med"/>
-          </a:ln>
-          <a:effectLst/>
-        </p:spPr>
-        <p:style>
-          <a:lnRef idx="1">
-            <a:schemeClr val="accent2"/>
-          </a:lnRef>
-          <a:fillRef idx="2">
-            <a:schemeClr val="accent2"/>
-          </a:fillRef>
-          <a:effectRef idx="1">
-            <a:schemeClr val="accent2"/>
-          </a:effectRef>
-          <a:fontRef idx="minor">
-            <a:schemeClr val="dk1"/>
-          </a:fontRef>
-        </p:style>
-      </p:cxnSp>
-      <p:sp>
-        <p:nvSpPr>
-          <p:cNvPr id="91" name="Isosceles Triangle 102"/>
-          <p:cNvSpPr/>
-          <p:nvPr/>
-        </p:nvSpPr>
-        <p:spPr>
-          <a:xfrm rot="10800000" flipV="1">
-            <a:off x="3479324" y="2386348"/>
-            <a:ext cx="282387" cy="157062"/>
-          </a:xfrm>
-          <a:prstGeom prst="triangle">
-            <a:avLst/>
-          </a:prstGeom>
-          <a:ln w="19050">
-            <a:solidFill>
-              <a:srgbClr val="7030A0"/>
-            </a:solidFill>
-          </a:ln>
-          <a:effectLst/>
-        </p:spPr>
-        <p:style>
-          <a:lnRef idx="1">
-            <a:schemeClr val="accent4"/>
-          </a:lnRef>
-          <a:fillRef idx="2">
-            <a:schemeClr val="accent4"/>
-          </a:fillRef>
-          <a:effectRef idx="1">
-            <a:schemeClr val="accent4"/>
-          </a:effectRef>
-          <a:fontRef idx="minor">
-            <a:schemeClr val="dk1"/>
-          </a:fontRef>
-        </p:style>
-        <p:txBody>
-          <a:bodyPr rtlCol="0" anchor="ctr"/>
-          <a:lstStyle/>
-          <a:p>
-            <a:pPr algn="ctr"/>
-            <a:endParaRPr lang="en-SG" sz="1050" b="1">
-              <a:solidFill>
-                <a:srgbClr val="92D050"/>
-              </a:solidFill>
-            </a:endParaRPr>
-          </a:p>
-        </p:txBody>
-      </p:sp>
-      <p:sp>
-        <p:nvSpPr>
-          <p:cNvPr id="92" name="Rectangle 8"/>
-          <p:cNvSpPr/>
-          <p:nvPr/>
-        </p:nvSpPr>
-        <p:spPr>
-          <a:xfrm>
-            <a:off x="1177947" y="1998144"/>
-            <a:ext cx="1443661" cy="364396"/>
-          </a:xfrm>
-          <a:prstGeom prst="rect">
-            <a:avLst/>
-          </a:prstGeom>
-          <a:ln w="19050">
-            <a:solidFill>
-              <a:srgbClr val="7030A0"/>
-            </a:solidFill>
-          </a:ln>
-          <a:effectLst/>
-        </p:spPr>
-        <p:style>
-          <a:lnRef idx="1">
-            <a:schemeClr val="accent4"/>
-          </a:lnRef>
-          <a:fillRef idx="2">
-            <a:schemeClr val="accent4"/>
-          </a:fillRef>
-          <a:effectRef idx="1">
-            <a:schemeClr val="accent4"/>
-          </a:effectRef>
-          <a:fontRef idx="minor">
-            <a:schemeClr val="dk1"/>
-          </a:fontRef>
-        </p:style>
-        <p:txBody>
-          <a:bodyPr rtlCol="0" anchor="ctr"/>
-          <a:lstStyle/>
-          <a:p>
-            <a:pPr algn="ctr"/>
-            <a:r>
-              <a:rPr lang="en-US" sz="1050" dirty="0">
-                <a:solidFill>
-                  <a:srgbClr val="7030A0"/>
-                </a:solidFill>
-              </a:rPr>
-              <a:t>&lt;&lt;interface&gt;&gt;</a:t>
-            </a:r>
-            <a:br>
-              <a:rPr lang="en-US" sz="1050" dirty="0">
-                <a:solidFill>
-                  <a:srgbClr val="7030A0"/>
-                </a:solidFill>
-              </a:rPr>
-            </a:br>
-            <a:r>
-              <a:rPr lang="en-US" sz="1050" dirty="0" err="1">
-                <a:solidFill>
-                  <a:srgbClr val="7030A0"/>
-                </a:solidFill>
-              </a:rPr>
-              <a:t>ReadOnlyAddressBook</a:t>
-            </a:r>
-            <a:endParaRPr lang="en-SG" sz="1050" dirty="0">
-              <a:solidFill>
-                <a:srgbClr val="7030A0"/>
-              </a:solidFill>
-            </a:endParaRPr>
-          </a:p>
-        </p:txBody>
-      </p:sp>
-      <p:sp>
-        <p:nvSpPr>
-          <p:cNvPr id="93" name="Rectangle 8"/>
-          <p:cNvSpPr/>
-          <p:nvPr/>
-        </p:nvSpPr>
-        <p:spPr>
-          <a:xfrm>
-            <a:off x="3087206" y="1998144"/>
-            <a:ext cx="1060683" cy="364396"/>
-          </a:xfrm>
-          <a:prstGeom prst="rect">
-            <a:avLst/>
-          </a:prstGeom>
-          <a:ln w="19050">
-            <a:solidFill>
-              <a:srgbClr val="7030A0"/>
-            </a:solidFill>
-          </a:ln>
-          <a:effectLst/>
-        </p:spPr>
-        <p:style>
-          <a:lnRef idx="1">
-            <a:schemeClr val="accent4"/>
-          </a:lnRef>
-          <a:fillRef idx="2">
-            <a:schemeClr val="accent4"/>
-          </a:fillRef>
-          <a:effectRef idx="1">
-            <a:schemeClr val="accent4"/>
-          </a:effectRef>
-          <a:fontRef idx="minor">
-            <a:schemeClr val="dk1"/>
-          </a:fontRef>
-        </p:style>
-        <p:txBody>
-          <a:bodyPr rtlCol="0" anchor="ctr"/>
-          <a:lstStyle/>
-          <a:p>
-            <a:pPr algn="ctr"/>
-            <a:r>
-              <a:rPr lang="en-US" sz="1050" dirty="0" err="1">
-                <a:solidFill>
-                  <a:srgbClr val="7030A0"/>
-                </a:solidFill>
-              </a:rPr>
-              <a:t>AddressBook</a:t>
-            </a:r>
-            <a:endParaRPr lang="en-SG" sz="1050" dirty="0">
-              <a:solidFill>
-                <a:srgbClr val="7030A0"/>
-              </a:solidFill>
-            </a:endParaRPr>
-          </a:p>
-        </p:txBody>
-      </p:sp>
-      <p:sp>
-        <p:nvSpPr>
-          <p:cNvPr id="94" name="Isosceles Triangle 102"/>
-          <p:cNvSpPr/>
-          <p:nvPr/>
-        </p:nvSpPr>
-        <p:spPr>
-          <a:xfrm rot="16200000">
-            <a:off x="2586098" y="2068952"/>
-            <a:ext cx="271014" cy="187417"/>
-          </a:xfrm>
-          <a:prstGeom prst="triangle">
-            <a:avLst>
-              <a:gd name="adj" fmla="val 44517"/>
-            </a:avLst>
-          </a:prstGeom>
-          <a:solidFill>
-            <a:schemeClr val="accent4">
-              <a:lumMod val="20000"/>
-              <a:lumOff val="80000"/>
-            </a:schemeClr>
-          </a:solidFill>
-          <a:ln w="19050">
-            <a:solidFill>
-              <a:srgbClr val="7030A0"/>
-            </a:solidFill>
-          </a:ln>
-          <a:effectLst/>
-        </p:spPr>
-        <p:style>
-          <a:lnRef idx="1">
-            <a:schemeClr val="accent6"/>
-          </a:lnRef>
-          <a:fillRef idx="2">
-            <a:schemeClr val="accent6"/>
-          </a:fillRef>
-          <a:effectRef idx="1">
-            <a:schemeClr val="accent6"/>
-          </a:effectRef>
-          <a:fontRef idx="minor">
-            <a:schemeClr val="dk1"/>
-          </a:fontRef>
-        </p:style>
-        <p:txBody>
-          <a:bodyPr rtlCol="0" anchor="ctr"/>
-          <a:lstStyle/>
-          <a:p>
-            <a:pPr algn="ctr"/>
-            <a:endParaRPr lang="en-SG" sz="1050"/>
-          </a:p>
-        </p:txBody>
-      </p:sp>
-      <p:cxnSp>
-        <p:nvCxnSpPr>
-          <p:cNvPr id="95" name="Elbow Connector 63"/>
-          <p:cNvCxnSpPr>
-            <a:stCxn id="94" idx="3"/>
-            <a:endCxn id="93" idx="1"/>
-          </p:cNvCxnSpPr>
-          <p:nvPr/>
-        </p:nvCxnSpPr>
-        <p:spPr>
-          <a:xfrm>
-            <a:off x="2815314" y="2177521"/>
-            <a:ext cx="271892" cy="2821"/>
-          </a:xfrm>
-          <a:prstGeom prst="bentConnector3">
-            <a:avLst>
-              <a:gd name="adj1" fmla="val 50000"/>
-            </a:avLst>
-          </a:prstGeom>
-          <a:ln w="19050">
-            <a:solidFill>
-              <a:srgbClr val="7030A0"/>
-            </a:solidFill>
-            <a:prstDash val="sysDot"/>
-            <a:headEnd type="none" w="med" len="med"/>
-            <a:tailEnd type="none" w="med" len="med"/>
           </a:ln>
           <a:effectLst/>
         </p:spPr>

</xml_diff>